<commit_message>
Changed the title slide
</commit_message>
<xml_diff>
--- a/Anti-Cargo-Presentation.pptx
+++ b/Anti-Cargo-Presentation.pptx
@@ -451,7 +451,7 @@
             <a:fld id="{5923F103-BC34-4FE4-A40E-EDDEECFDA5D0}" type="datetimeFigureOut">
               <a:rPr lang="en-US" dirty="0"/>
               <a:pPr/>
-              <a:t>1/26/2019</a:t>
+              <a:t>1/27/2019</a:t>
             </a:fld>
             <a:endParaRPr lang="en-US" dirty="0"/>
           </a:p>
@@ -1535,7 +1535,7 @@
           <a:p>
             <a:fld id="{923A1CC3-2375-41D4-9E03-427CAF2A4C1A}" type="datetimeFigureOut">
               <a:rPr lang="en-US" dirty="0"/>
-              <a:t>1/26/2019</a:t>
+              <a:t>1/27/2019</a:t>
             </a:fld>
             <a:endParaRPr lang="en-US" dirty="0"/>
           </a:p>
@@ -2511,7 +2511,7 @@
           <a:p>
             <a:fld id="{AFF16868-8199-4C2C-A5B1-63AEE139F88E}" type="datetimeFigureOut">
               <a:rPr lang="en-US" dirty="0"/>
-              <a:t>1/26/2019</a:t>
+              <a:t>1/27/2019</a:t>
             </a:fld>
             <a:endParaRPr lang="en-US" dirty="0"/>
           </a:p>
@@ -3641,7 +3641,7 @@
           <a:p>
             <a:fld id="{AAD9FF7F-6988-44CC-821B-644E70CD2F73}" type="datetimeFigureOut">
               <a:rPr lang="en-US" dirty="0"/>
-              <a:t>1/26/2019</a:t>
+              <a:t>1/27/2019</a:t>
             </a:fld>
             <a:endParaRPr lang="en-US" dirty="0"/>
           </a:p>
@@ -4670,7 +4670,7 @@
           <a:p>
             <a:fld id="{5C12C299-16B2-4475-990D-751901EACC14}" type="datetimeFigureOut">
               <a:rPr lang="en-US" dirty="0"/>
-              <a:t>1/26/2019</a:t>
+              <a:t>1/27/2019</a:t>
             </a:fld>
             <a:endParaRPr lang="en-US" dirty="0"/>
           </a:p>
@@ -5326,7 +5326,7 @@
           <a:p>
             <a:fld id="{9FE86839-B9D8-4651-8783-F325ECE74E65}" type="datetimeFigureOut">
               <a:rPr lang="en-US" dirty="0"/>
-              <a:t>1/26/2019</a:t>
+              <a:t>1/27/2019</a:t>
             </a:fld>
             <a:endParaRPr lang="en-US" dirty="0"/>
           </a:p>
@@ -6183,7 +6183,7 @@
           <a:p>
             <a:fld id="{FD484F64-32F6-45C5-931F-ADC1662401D0}" type="datetimeFigureOut">
               <a:rPr lang="en-US" dirty="0"/>
-              <a:t>1/26/2019</a:t>
+              <a:t>1/27/2019</a:t>
             </a:fld>
             <a:endParaRPr lang="en-US" dirty="0"/>
           </a:p>
@@ -6369,7 +6369,7 @@
           <a:p>
             <a:fld id="{53086D93-FCAC-47E0-A2EE-787E62CA814C}" type="datetimeFigureOut">
               <a:rPr lang="en-US" dirty="0"/>
-              <a:t>1/26/2019</a:t>
+              <a:t>1/27/2019</a:t>
             </a:fld>
             <a:endParaRPr lang="en-US" dirty="0"/>
           </a:p>
@@ -7337,7 +7337,7 @@
           <a:p>
             <a:fld id="{CDA879A6-0FD0-4734-A311-86BFCA472E6E}" type="datetimeFigureOut">
               <a:rPr lang="en-US" dirty="0"/>
-              <a:t>1/26/2019</a:t>
+              <a:t>1/27/2019</a:t>
             </a:fld>
             <a:endParaRPr lang="en-US" dirty="0"/>
           </a:p>
@@ -7544,7 +7544,7 @@
           <a:p>
             <a:fld id="{19C9CA7B-DFD4-44B5-8C60-D14B8CD1FB59}" type="datetimeFigureOut">
               <a:rPr lang="en-US" dirty="0"/>
-              <a:t>1/26/2019</a:t>
+              <a:t>1/27/2019</a:t>
             </a:fld>
             <a:endParaRPr lang="en-US" dirty="0"/>
           </a:p>
@@ -8574,7 +8574,7 @@
           <a:p>
             <a:fld id="{F34E6425-0181-43F2-84FC-787E803FD2F8}" type="datetimeFigureOut">
               <a:rPr lang="en-US" dirty="0"/>
-              <a:t>1/26/2019</a:t>
+              <a:t>1/27/2019</a:t>
             </a:fld>
             <a:endParaRPr lang="en-US" dirty="0"/>
           </a:p>
@@ -8842,7 +8842,7 @@
           <a:p>
             <a:fld id="{3BDB8791-F1B0-41E7-B7FD-A781E65C4266}" type="datetimeFigureOut">
               <a:rPr lang="en-US" dirty="0"/>
-              <a:t>1/26/2019</a:t>
+              <a:t>1/27/2019</a:t>
             </a:fld>
             <a:endParaRPr lang="en-US" dirty="0"/>
           </a:p>
@@ -9248,7 +9248,7 @@
           <a:p>
             <a:fld id="{5FDD63B2-E120-4ED8-B27B-C685F510A5FE}" type="datetimeFigureOut">
               <a:rPr lang="en-US" dirty="0"/>
-              <a:t>1/26/2019</a:t>
+              <a:t>1/27/2019</a:t>
             </a:fld>
             <a:endParaRPr lang="en-US" dirty="0"/>
           </a:p>
@@ -9371,7 +9371,7 @@
           <a:p>
             <a:fld id="{7AA18ACC-A947-437B-A130-35BD54FDF1E9}" type="datetimeFigureOut">
               <a:rPr lang="en-US" dirty="0"/>
-              <a:t>1/26/2019</a:t>
+              <a:t>1/27/2019</a:t>
             </a:fld>
             <a:endParaRPr lang="en-US" dirty="0"/>
           </a:p>
@@ -9462,7 +9462,7 @@
           <a:p>
             <a:fld id="{7C8D7E02-BCB8-4D50-A234-369438C08659}" type="datetimeFigureOut">
               <a:rPr lang="en-US" dirty="0"/>
-              <a:t>1/26/2019</a:t>
+              <a:t>1/27/2019</a:t>
             </a:fld>
             <a:endParaRPr lang="en-US" dirty="0"/>
           </a:p>
@@ -10539,7 +10539,7 @@
           <a:p>
             <a:fld id="{76E86A4C-8E40-4F87-A4F0-01A0687C5742}" type="datetimeFigureOut">
               <a:rPr lang="en-US" dirty="0"/>
-              <a:t>1/26/2019</a:t>
+              <a:t>1/27/2019</a:t>
             </a:fld>
             <a:endParaRPr lang="en-US" dirty="0"/>
           </a:p>
@@ -11643,7 +11643,7 @@
           <a:p>
             <a:fld id="{35E72C73-2D91-4E12-BA25-F0AA0C03599B}" type="datetimeFigureOut">
               <a:rPr lang="en-US" dirty="0"/>
-              <a:t>1/26/2019</a:t>
+              <a:t>1/27/2019</a:t>
             </a:fld>
             <a:endParaRPr lang="en-US" dirty="0"/>
           </a:p>
@@ -12636,7 +12636,7 @@
           <a:p>
             <a:fld id="{2BE451C3-0FF4-47C4-B829-773ADF60F88C}" type="datetimeFigureOut">
               <a:rPr lang="en-US" dirty="0"/>
-              <a:t>1/26/2019</a:t>
+              <a:t>1/27/2019</a:t>
             </a:fld>
             <a:endParaRPr lang="en-US" dirty="0"/>
           </a:p>
@@ -13208,14 +13208,27 @@
             <p:ph type="ctrTitle"/>
           </p:nvPr>
         </p:nvSpPr>
-        <p:spPr/>
+        <p:spPr>
+          <a:xfrm>
+            <a:off x="1683171" y="741796"/>
+            <a:ext cx="8825658" cy="2677648"/>
+          </a:xfrm>
+        </p:spPr>
         <p:txBody>
           <a:bodyPr/>
           <a:lstStyle/>
           <a:p>
+            <a:pPr algn="ctr"/>
             <a:r>
               <a:rPr lang="en-US" dirty="0"/>
-              <a:t>Anti Cargo Theft</a:t>
+              <a:t>Where’d that </a:t>
+            </a:r>
+            <a:br>
+              <a:rPr lang="en-US" dirty="0"/>
+            </a:br>
+            <a:r>
+              <a:rPr lang="en-US" dirty="0"/>
+              <a:t>Car-go?</a:t>
             </a:r>
           </a:p>
         </p:txBody>
@@ -13242,24 +13255,103 @@
           <a:lstStyle/>
           <a:p>
             <a:r>
-              <a:rPr lang="en-US" dirty="0"/>
-              <a:t>Mostafa Mohsen, Christopher Vishnu</a:t>
-            </a:r>
-          </a:p>
-          <a:p>
-            <a:r>
-              <a:rPr lang="en-US" dirty="0" err="1"/>
-              <a:t>Ather</a:t>
+              <a:rPr lang="en-US" b="1" dirty="0">
+                <a:solidFill>
+                  <a:schemeClr val="tx1"/>
+                </a:solidFill>
+                <a:effectLst>
+                  <a:outerShdw blurRad="38100" dist="38100" dir="2700000" algn="tl">
+                    <a:srgbClr val="000000">
+                      <a:alpha val="43137"/>
+                    </a:srgbClr>
+                  </a:outerShdw>
+                </a:effectLst>
+              </a:rPr>
+              <a:t>M</a:t>
             </a:r>
             <a:r>
               <a:rPr lang="en-US" dirty="0"/>
-              <a:t> Hassan, Ryan </a:t>
+              <a:t>ostafa Mohsen, </a:t>
+            </a:r>
+            <a:r>
+              <a:rPr lang="en-US" b="1" dirty="0">
+                <a:solidFill>
+                  <a:schemeClr val="tx1"/>
+                </a:solidFill>
+              </a:rPr>
+              <a:t>A</a:t>
+            </a:r>
+            <a:r>
+              <a:rPr lang="en-US" dirty="0"/>
+              <a:t>ther </a:t>
+            </a:r>
+            <a:r>
+              <a:rPr lang="en-US" dirty="0" err="1"/>
+              <a:t>hassan</a:t>
+            </a:r>
+            <a:r>
+              <a:rPr lang="en-US" dirty="0"/>
+              <a:t>, </a:t>
+            </a:r>
+            <a:r>
+              <a:rPr lang="en-US" b="1" dirty="0">
+                <a:solidFill>
+                  <a:schemeClr val="tx1"/>
+                </a:solidFill>
+              </a:rPr>
+              <a:t>R</a:t>
+            </a:r>
+            <a:r>
+              <a:rPr lang="en-US" dirty="0"/>
+              <a:t>yan </a:t>
             </a:r>
             <a:r>
               <a:rPr lang="en-US" dirty="0" err="1"/>
               <a:t>woodard</a:t>
             </a:r>
-            <a:endParaRPr lang="en-US" dirty="0"/>
+            <a:r>
+              <a:rPr lang="en-US" dirty="0"/>
+              <a:t>, </a:t>
+            </a:r>
+            <a:r>
+              <a:rPr lang="en-US" b="1" dirty="0">
+                <a:solidFill>
+                  <a:schemeClr val="tx1"/>
+                </a:solidFill>
+              </a:rPr>
+              <a:t>C</a:t>
+            </a:r>
+            <a:r>
+              <a:rPr lang="en-US" dirty="0"/>
+              <a:t>hristopher Vishnu</a:t>
+            </a:r>
+          </a:p>
+          <a:p>
+            <a:pPr algn="ctr"/>
+            <a:r>
+              <a:rPr lang="en-US" i="1" dirty="0">
+                <a:latin typeface="Arial" panose="020B0604020202020204" pitchFamily="34" charset="0"/>
+                <a:cs typeface="Arial" panose="020B0604020202020204" pitchFamily="34" charset="0"/>
+              </a:rPr>
+              <a:t>Here to make our </a:t>
+            </a:r>
+            <a:r>
+              <a:rPr lang="en-US" b="1" i="1" dirty="0">
+                <a:solidFill>
+                  <a:schemeClr val="tx1"/>
+                </a:solidFill>
+                <a:latin typeface="Arial" panose="020B0604020202020204" pitchFamily="34" charset="0"/>
+                <a:cs typeface="Arial" panose="020B0604020202020204" pitchFamily="34" charset="0"/>
+              </a:rPr>
+              <a:t>marc </a:t>
+            </a:r>
+            <a:r>
+              <a:rPr lang="en-US" i="1" dirty="0">
+                <a:latin typeface="Arial" panose="020B0604020202020204" pitchFamily="34" charset="0"/>
+                <a:cs typeface="Arial" panose="020B0604020202020204" pitchFamily="34" charset="0"/>
+              </a:rPr>
+              <a:t>on the world</a:t>
+            </a:r>
           </a:p>
         </p:txBody>
       </p:sp>

</xml_diff>